<commit_message>
project writeup and explore
</commit_message>
<xml_diff>
--- a/projects/final-projects/01-lightning-talk/FinalProjectIdeas.pptx
+++ b/projects/final-projects/01-lightning-talk/FinalProjectIdeas.pptx
@@ -108,6 +108,11 @@
       </a:defRPr>
     </a:lvl9pPr>
   </p:defaultTextStyle>
+  <p:extLst>
+    <p:ext uri="{EFAFB233-063F-42B5-8137-9DF3F51BA10A}">
+      <p15:sldGuideLst xmlns:p15="http://schemas.microsoft.com/office/powerpoint/2012/main"/>
+    </p:ext>
+  </p:extLst>
 </p:presentation>
 </file>
 
@@ -274,7 +279,7 @@
           <a:p>
             <a:fld id="{ACEF0901-7382-254A-831F-BDE73B001185}" type="datetimeFigureOut">
               <a:rPr lang="en-US" smtClean="0"/>
-              <a:t>8/15/17</a:t>
+              <a:t>8/24/17</a:t>
             </a:fld>
             <a:endParaRPr lang="en-US"/>
           </a:p>
@@ -439,7 +444,7 @@
           <a:p>
             <a:fld id="{ACEF0901-7382-254A-831F-BDE73B001185}" type="datetimeFigureOut">
               <a:rPr lang="en-US" smtClean="0"/>
-              <a:t>8/15/17</a:t>
+              <a:t>8/24/17</a:t>
             </a:fld>
             <a:endParaRPr lang="en-US"/>
           </a:p>
@@ -614,7 +619,7 @@
           <a:p>
             <a:fld id="{ACEF0901-7382-254A-831F-BDE73B001185}" type="datetimeFigureOut">
               <a:rPr lang="en-US" smtClean="0"/>
-              <a:t>8/15/17</a:t>
+              <a:t>8/24/17</a:t>
             </a:fld>
             <a:endParaRPr lang="en-US"/>
           </a:p>
@@ -779,7 +784,7 @@
           <a:p>
             <a:fld id="{ACEF0901-7382-254A-831F-BDE73B001185}" type="datetimeFigureOut">
               <a:rPr lang="en-US" smtClean="0"/>
-              <a:t>8/15/17</a:t>
+              <a:t>8/24/17</a:t>
             </a:fld>
             <a:endParaRPr lang="en-US"/>
           </a:p>
@@ -1042,7 +1047,7 @@
           <a:p>
             <a:fld id="{ACEF0901-7382-254A-831F-BDE73B001185}" type="datetimeFigureOut">
               <a:rPr lang="en-US" smtClean="0"/>
-              <a:t>8/15/17</a:t>
+              <a:t>8/24/17</a:t>
             </a:fld>
             <a:endParaRPr lang="en-US"/>
           </a:p>
@@ -1269,7 +1274,7 @@
           <a:p>
             <a:fld id="{ACEF0901-7382-254A-831F-BDE73B001185}" type="datetimeFigureOut">
               <a:rPr lang="en-US" smtClean="0"/>
-              <a:t>8/15/17</a:t>
+              <a:t>8/24/17</a:t>
             </a:fld>
             <a:endParaRPr lang="en-US"/>
           </a:p>
@@ -1623,7 +1628,7 @@
           <a:p>
             <a:fld id="{ACEF0901-7382-254A-831F-BDE73B001185}" type="datetimeFigureOut">
               <a:rPr lang="en-US" smtClean="0"/>
-              <a:t>8/15/17</a:t>
+              <a:t>8/24/17</a:t>
             </a:fld>
             <a:endParaRPr lang="en-US"/>
           </a:p>
@@ -1759,7 +1764,7 @@
           <a:p>
             <a:fld id="{ACEF0901-7382-254A-831F-BDE73B001185}" type="datetimeFigureOut">
               <a:rPr lang="en-US" smtClean="0"/>
-              <a:t>8/15/17</a:t>
+              <a:t>8/24/17</a:t>
             </a:fld>
             <a:endParaRPr lang="en-US"/>
           </a:p>
@@ -1849,7 +1854,7 @@
           <a:p>
             <a:fld id="{ACEF0901-7382-254A-831F-BDE73B001185}" type="datetimeFigureOut">
               <a:rPr lang="en-US" smtClean="0"/>
-              <a:t>8/15/17</a:t>
+              <a:t>8/24/17</a:t>
             </a:fld>
             <a:endParaRPr lang="en-US"/>
           </a:p>
@@ -2201,7 +2206,7 @@
           <a:p>
             <a:fld id="{ACEF0901-7382-254A-831F-BDE73B001185}" type="datetimeFigureOut">
               <a:rPr lang="en-US" smtClean="0"/>
-              <a:t>8/15/17</a:t>
+              <a:t>8/24/17</a:t>
             </a:fld>
             <a:endParaRPr lang="en-US"/>
           </a:p>
@@ -2553,7 +2558,7 @@
           <a:p>
             <a:fld id="{ACEF0901-7382-254A-831F-BDE73B001185}" type="datetimeFigureOut">
               <a:rPr lang="en-US" smtClean="0"/>
-              <a:t>8/15/17</a:t>
+              <a:t>8/24/17</a:t>
             </a:fld>
             <a:endParaRPr lang="en-US"/>
           </a:p>
@@ -2789,7 +2794,7 @@
           <a:p>
             <a:fld id="{ACEF0901-7382-254A-831F-BDE73B001185}" type="datetimeFigureOut">
               <a:rPr lang="en-US" smtClean="0"/>
-              <a:t>8/15/17</a:t>
+              <a:t>8/24/17</a:t>
             </a:fld>
             <a:endParaRPr lang="en-US"/>
           </a:p>
@@ -3297,6 +3302,13 @@
   <p:clrMapOvr>
     <a:masterClrMapping/>
   </p:clrMapOvr>
+  <p:timing>
+    <p:tnLst>
+      <p:par>
+        <p:cTn id="1" dur="indefinite" restart="never" nodeType="tmRoot"/>
+      </p:par>
+    </p:tnLst>
+  </p:timing>
 </p:sld>
 </file>
 
@@ -3367,19 +3379,20 @@
             </a:r>
             <a:r>
               <a:rPr lang="en-US" dirty="0"/>
-              <a:t>to verify this theory and see what else is a factor: http://</a:t>
+              <a:t>to verify this theory and see what else is a factor: </a:t>
+            </a:r>
+            <a:r>
+              <a:rPr lang="en-US" dirty="0"/>
+              <a:t>https://</a:t>
             </a:r>
             <a:r>
               <a:rPr lang="en-US" dirty="0" err="1"/>
-              <a:t>jacksonville.com</a:t>
+              <a:t>www.brookings.edu</a:t>
             </a:r>
             <a:r>
               <a:rPr lang="en-US" dirty="0"/>
-              <a:t>/opinion/editorials/2012-01-27/story/three-rules-staying-out-poverty</a:t>
-            </a:r>
-            <a:endParaRPr lang="en-US" dirty="0" smtClean="0"/>
-          </a:p>
-          <a:p>
+              <a:t>/opinions/three-simple-rules-poor-teens-should-follow-to-join-the-middle-class/</a:t>
+            </a:r>
             <a:endParaRPr lang="en-US" dirty="0"/>
           </a:p>
         </p:txBody>
@@ -3394,6 +3407,13 @@
   <p:clrMapOvr>
     <a:masterClrMapping/>
   </p:clrMapOvr>
+  <p:timing>
+    <p:tnLst>
+      <p:par>
+        <p:cTn id="1" dur="indefinite" restart="never" nodeType="tmRoot"/>
+      </p:par>
+    </p:tnLst>
+  </p:timing>
 </p:sld>
 </file>
 
@@ -3491,6 +3511,13 @@
   <p:clrMapOvr>
     <a:masterClrMapping/>
   </p:clrMapOvr>
+  <p:timing>
+    <p:tnLst>
+      <p:par>
+        <p:cTn id="1" dur="indefinite" restart="never" nodeType="tmRoot"/>
+      </p:par>
+    </p:tnLst>
+  </p:timing>
 </p:sld>
 </file>
 
@@ -3581,6 +3608,13 @@
   <p:clrMapOvr>
     <a:masterClrMapping/>
   </p:clrMapOvr>
+  <p:timing>
+    <p:tnLst>
+      <p:par>
+        <p:cTn id="1" dur="indefinite" restart="never" nodeType="tmRoot"/>
+      </p:par>
+    </p:tnLst>
+  </p:timing>
 </p:sld>
 </file>
 
@@ -3640,16 +3674,53 @@
           <a:lstStyle/>
           <a:p>
             <a:r>
+              <a:rPr lang="en-US" dirty="0" err="1"/>
+              <a:t>DataSF</a:t>
+            </a:r>
+            <a:r>
+              <a:rPr lang="en-US" dirty="0"/>
+              <a:t> - Police Department </a:t>
+            </a:r>
+            <a:r>
+              <a:rPr lang="en-US" dirty="0" smtClean="0"/>
+              <a:t>Incidents</a:t>
+            </a:r>
+          </a:p>
+          <a:p>
+            <a:r>
+              <a:rPr lang="en-US" dirty="0" smtClean="0"/>
+              <a:t>Weather</a:t>
+            </a:r>
+          </a:p>
+          <a:p>
+            <a:r>
+              <a:rPr lang="en-US" dirty="0" smtClean="0"/>
+              <a:t>Twitter API</a:t>
+            </a:r>
+          </a:p>
+          <a:p>
+            <a:r>
+              <a:rPr lang="en-US" dirty="0" smtClean="0"/>
+              <a:t>ImageNet</a:t>
+            </a:r>
+            <a:endParaRPr lang="en-US" dirty="0" smtClean="0"/>
+          </a:p>
+          <a:p>
+            <a:r>
               <a:rPr lang="en-US" dirty="0" smtClean="0"/>
               <a:t>Wikipedia</a:t>
             </a:r>
+            <a:endParaRPr lang="en-US" dirty="0" smtClean="0"/>
           </a:p>
           <a:p>
             <a:r>
               <a:rPr lang="en-US" dirty="0"/>
-              <a:t>google trends</a:t>
-            </a:r>
-            <a:endParaRPr lang="en-US" dirty="0" smtClean="0"/>
+              <a:t>google </a:t>
+            </a:r>
+            <a:r>
+              <a:rPr lang="en-US" dirty="0" smtClean="0"/>
+              <a:t>trends</a:t>
+            </a:r>
           </a:p>
           <a:p>
             <a:endParaRPr lang="en-US" dirty="0"/>
@@ -3666,6 +3737,13 @@
   <p:clrMapOvr>
     <a:masterClrMapping/>
   </p:clrMapOvr>
+  <p:timing>
+    <p:tnLst>
+      <p:par>
+        <p:cTn id="1" dur="indefinite" restart="never" nodeType="tmRoot"/>
+      </p:par>
+    </p:tnLst>
+  </p:timing>
 </p:sld>
 </file>
 

</xml_diff>